<commit_message>
Update presentation file with new content and formatting
</commit_message>
<xml_diff>
--- a/Social Enterprise/이인희 약력 및 소개.pptx
+++ b/Social Enterprise/이인희 약력 및 소개.pptx
@@ -4038,4 +4038,213 @@
     </a:ext>
   </a:extLst>
 </a:theme>
+</file>
+
+<file path=customXml/item1.xml><?xml version="1.0" encoding="utf-8"?>
+<ct:contentTypeSchema xmlns:ct="http://schemas.microsoft.com/office/2006/metadata/contentType" xmlns:ma="http://schemas.microsoft.com/office/2006/metadata/properties/metaAttributes" ct:_="" ma:_="" ma:contentTypeName="Document" ma:contentTypeID="0x01010089C4D2C766D8D8439BE1066AE870F215" ma:contentTypeVersion="10" ma:contentTypeDescription="Create a new document." ma:contentTypeScope="" ma:versionID="53a7b00c97c089a1aac2965fa8afdf88">
+  <xsd:schema xmlns:xsd="http://www.w3.org/2001/XMLSchema" xmlns:xs="http://www.w3.org/2001/XMLSchema" xmlns:p="http://schemas.microsoft.com/office/2006/metadata/properties" xmlns:ns2="25391028-02bd-44eb-89ce-c859de1c4f55" targetNamespace="http://schemas.microsoft.com/office/2006/metadata/properties" ma:root="true" ma:fieldsID="5960622e01d4445b7feaa503e6944d74" ns2:_="">
+    <xsd:import namespace="25391028-02bd-44eb-89ce-c859de1c4f55"/>
+    <xsd:element name="properties">
+      <xsd:complexType>
+        <xsd:sequence>
+          <xsd:element name="documentManagement">
+            <xsd:complexType>
+              <xsd:all>
+                <xsd:element ref="ns2:MediaServiceMetadata" minOccurs="0"/>
+                <xsd:element ref="ns2:MediaServiceFastMetadata" minOccurs="0"/>
+                <xsd:element ref="ns2:MediaServiceSearchProperties" minOccurs="0"/>
+                <xsd:element ref="ns2:MediaServiceDateTaken" minOccurs="0"/>
+                <xsd:element ref="ns2:MediaServiceGenerationTime" minOccurs="0"/>
+                <xsd:element ref="ns2:MediaServiceEventHashCode" minOccurs="0"/>
+                <xsd:element ref="ns2:lcf76f155ced4ddcb4097134ff3c332f" minOccurs="0"/>
+                <xsd:element ref="ns2:MediaServiceOCR" minOccurs="0"/>
+                <xsd:element ref="ns2:MediaLengthInSeconds" minOccurs="0"/>
+              </xsd:all>
+            </xsd:complexType>
+          </xsd:element>
+        </xsd:sequence>
+      </xsd:complexType>
+    </xsd:element>
+  </xsd:schema>
+  <xsd:schema xmlns:xsd="http://www.w3.org/2001/XMLSchema" xmlns:xs="http://www.w3.org/2001/XMLSchema" xmlns:dms="http://schemas.microsoft.com/office/2006/documentManagement/types" xmlns:pc="http://schemas.microsoft.com/office/infopath/2007/PartnerControls" targetNamespace="25391028-02bd-44eb-89ce-c859de1c4f55" elementFormDefault="qualified">
+    <xsd:import namespace="http://schemas.microsoft.com/office/2006/documentManagement/types"/>
+    <xsd:import namespace="http://schemas.microsoft.com/office/infopath/2007/PartnerControls"/>
+    <xsd:element name="MediaServiceMetadata" ma:index="8" nillable="true" ma:displayName="MediaServiceMetadata" ma:hidden="true" ma:internalName="MediaServiceMetadata" ma:readOnly="true">
+      <xsd:simpleType>
+        <xsd:restriction base="dms:Note"/>
+      </xsd:simpleType>
+    </xsd:element>
+    <xsd:element name="MediaServiceFastMetadata" ma:index="9" nillable="true" ma:displayName="MediaServiceFastMetadata" ma:hidden="true" ma:internalName="MediaServiceFastMetadata" ma:readOnly="true">
+      <xsd:simpleType>
+        <xsd:restriction base="dms:Note"/>
+      </xsd:simpleType>
+    </xsd:element>
+    <xsd:element name="MediaServiceSearchProperties" ma:index="10" nillable="true" ma:displayName="MediaServiceSearchProperties" ma:hidden="true" ma:internalName="MediaServiceSearchProperties" ma:readOnly="true">
+      <xsd:simpleType>
+        <xsd:restriction base="dms:Note"/>
+      </xsd:simpleType>
+    </xsd:element>
+    <xsd:element name="MediaServiceDateTaken" ma:index="11" nillable="true" ma:displayName="MediaServiceDateTaken" ma:hidden="true" ma:indexed="true" ma:internalName="MediaServiceDateTaken" ma:readOnly="true">
+      <xsd:simpleType>
+        <xsd:restriction base="dms:Text"/>
+      </xsd:simpleType>
+    </xsd:element>
+    <xsd:element name="MediaServiceGenerationTime" ma:index="12" nillable="true" ma:displayName="MediaServiceGenerationTime" ma:hidden="true" ma:internalName="MediaServiceGenerationTime" ma:readOnly="true">
+      <xsd:simpleType>
+        <xsd:restriction base="dms:Text"/>
+      </xsd:simpleType>
+    </xsd:element>
+    <xsd:element name="MediaServiceEventHashCode" ma:index="13" nillable="true" ma:displayName="MediaServiceEventHashCode" ma:hidden="true" ma:internalName="MediaServiceEventHashCode" ma:readOnly="true">
+      <xsd:simpleType>
+        <xsd:restriction base="dms:Text"/>
+      </xsd:simpleType>
+    </xsd:element>
+    <xsd:element name="lcf76f155ced4ddcb4097134ff3c332f" ma:index="15" nillable="true" ma:taxonomy="true" ma:internalName="lcf76f155ced4ddcb4097134ff3c332f" ma:taxonomyFieldName="MediaServiceImageTags" ma:displayName="Image Tags" ma:readOnly="false" ma:fieldId="{5cf76f15-5ced-4ddc-b409-7134ff3c332f}" ma:taxonomyMulti="true" ma:sspId="2c80db7e-f82a-4f67-ad39-cc0146d5555d" ma:termSetId="09814cd3-568e-fe90-9814-8d621ff8fb84" ma:anchorId="fba54fb3-c3e1-fe81-a776-ca4b69148c4d" ma:open="true" ma:isKeyword="false">
+      <xsd:complexType>
+        <xsd:sequence>
+          <xsd:element ref="pc:Terms" minOccurs="0" maxOccurs="1"/>
+        </xsd:sequence>
+      </xsd:complexType>
+    </xsd:element>
+    <xsd:element name="MediaServiceOCR" ma:index="16" nillable="true" ma:displayName="Extracted Text" ma:internalName="MediaServiceOCR" ma:readOnly="true">
+      <xsd:simpleType>
+        <xsd:restriction base="dms:Note">
+          <xsd:maxLength value="255"/>
+        </xsd:restriction>
+      </xsd:simpleType>
+    </xsd:element>
+    <xsd:element name="MediaLengthInSeconds" ma:index="17" nillable="true" ma:displayName="MediaLengthInSeconds" ma:hidden="true" ma:internalName="MediaLengthInSeconds" ma:readOnly="true">
+      <xsd:simpleType>
+        <xsd:restriction base="dms:Unknown"/>
+      </xsd:simpleType>
+    </xsd:element>
+  </xsd:schema>
+  <xsd:schema xmlns="http://schemas.openxmlformats.org/package/2006/metadata/core-properties" xmlns:xsd="http://www.w3.org/2001/XMLSchema" xmlns:xsi="http://www.w3.org/2001/XMLSchema-instance" xmlns:dc="http://purl.org/dc/elements/1.1/" xmlns:dcterms="http://purl.org/dc/terms/" xmlns:odoc="http://schemas.microsoft.com/internal/obd" targetNamespace="http://schemas.openxmlformats.org/package/2006/metadata/core-properties" elementFormDefault="qualified" attributeFormDefault="unqualified" blockDefault="#all">
+    <xsd:import namespace="http://purl.org/dc/elements/1.1/" schemaLocation="http://dublincore.org/schemas/xmls/qdc/2003/04/02/dc.xsd"/>
+    <xsd:import namespace="http://purl.org/dc/terms/" schemaLocation="http://dublincore.org/schemas/xmls/qdc/2003/04/02/dcterms.xsd"/>
+    <xsd:element name="coreProperties" type="CT_coreProperties"/>
+    <xsd:complexType name="CT_coreProperties">
+      <xsd:all>
+        <xsd:element ref="dc:creator" minOccurs="0" maxOccurs="1"/>
+        <xsd:element ref="dcterms:created" minOccurs="0" maxOccurs="1"/>
+        <xsd:element ref="dc:identifier" minOccurs="0" maxOccurs="1"/>
+        <xsd:element name="contentType" minOccurs="0" maxOccurs="1" type="xsd:string" ma:index="0" ma:displayName="Content Type"/>
+        <xsd:element ref="dc:title" minOccurs="0" maxOccurs="1" ma:index="4" ma:displayName="Title"/>
+        <xsd:element ref="dc:subject" minOccurs="0" maxOccurs="1"/>
+        <xsd:element ref="dc:description" minOccurs="0" maxOccurs="1"/>
+        <xsd:element name="keywords" minOccurs="0" maxOccurs="1" type="xsd:string"/>
+        <xsd:element ref="dc:language" minOccurs="0" maxOccurs="1"/>
+        <xsd:element name="category" minOccurs="0" maxOccurs="1" type="xsd:string"/>
+        <xsd:element name="version" minOccurs="0" maxOccurs="1" type="xsd:string"/>
+        <xsd:element name="revision" minOccurs="0" maxOccurs="1" type="xsd:string">
+          <xsd:annotation>
+            <xsd:documentation>
+                        This value indicates the number of saves or revisions. The application is responsible for updating this value after each revision.
+                    </xsd:documentation>
+          </xsd:annotation>
+        </xsd:element>
+        <xsd:element name="lastModifiedBy" minOccurs="0" maxOccurs="1" type="xsd:string"/>
+        <xsd:element ref="dcterms:modified" minOccurs="0" maxOccurs="1"/>
+        <xsd:element name="contentStatus" minOccurs="0" maxOccurs="1" type="xsd:string"/>
+      </xsd:all>
+    </xsd:complexType>
+  </xsd:schema>
+  <xs:schema xmlns:pc="http://schemas.microsoft.com/office/infopath/2007/PartnerControls" xmlns:xs="http://www.w3.org/2001/XMLSchema" targetNamespace="http://schemas.microsoft.com/office/infopath/2007/PartnerControls" elementFormDefault="qualified" attributeFormDefault="unqualified">
+    <xs:element name="Person">
+      <xs:complexType>
+        <xs:sequence>
+          <xs:element ref="pc:DisplayName" minOccurs="0"/>
+          <xs:element ref="pc:AccountId" minOccurs="0"/>
+          <xs:element ref="pc:AccountType" minOccurs="0"/>
+        </xs:sequence>
+      </xs:complexType>
+    </xs:element>
+    <xs:element name="DisplayName" type="xs:string"/>
+    <xs:element name="AccountId" type="xs:string"/>
+    <xs:element name="AccountType" type="xs:string"/>
+    <xs:element name="BDCAssociatedEntity">
+      <xs:complexType>
+        <xs:sequence>
+          <xs:element ref="pc:BDCEntity" minOccurs="0" maxOccurs="unbounded"/>
+        </xs:sequence>
+        <xs:attribute ref="pc:EntityNamespace"/>
+        <xs:attribute ref="pc:EntityName"/>
+        <xs:attribute ref="pc:SystemInstanceName"/>
+        <xs:attribute ref="pc:AssociationName"/>
+      </xs:complexType>
+    </xs:element>
+    <xs:attribute name="EntityNamespace" type="xs:string"/>
+    <xs:attribute name="EntityName" type="xs:string"/>
+    <xs:attribute name="SystemInstanceName" type="xs:string"/>
+    <xs:attribute name="AssociationName" type="xs:string"/>
+    <xs:element name="BDCEntity">
+      <xs:complexType>
+        <xs:sequence>
+          <xs:element ref="pc:EntityDisplayName" minOccurs="0"/>
+          <xs:element ref="pc:EntityInstanceReference" minOccurs="0"/>
+          <xs:element ref="pc:EntityId1" minOccurs="0"/>
+          <xs:element ref="pc:EntityId2" minOccurs="0"/>
+          <xs:element ref="pc:EntityId3" minOccurs="0"/>
+          <xs:element ref="pc:EntityId4" minOccurs="0"/>
+          <xs:element ref="pc:EntityId5" minOccurs="0"/>
+        </xs:sequence>
+      </xs:complexType>
+    </xs:element>
+    <xs:element name="EntityDisplayName" type="xs:string"/>
+    <xs:element name="EntityInstanceReference" type="xs:string"/>
+    <xs:element name="EntityId1" type="xs:string"/>
+    <xs:element name="EntityId2" type="xs:string"/>
+    <xs:element name="EntityId3" type="xs:string"/>
+    <xs:element name="EntityId4" type="xs:string"/>
+    <xs:element name="EntityId5" type="xs:string"/>
+    <xs:element name="Terms">
+      <xs:complexType>
+        <xs:sequence>
+          <xs:element ref="pc:TermInfo" minOccurs="0" maxOccurs="unbounded"/>
+        </xs:sequence>
+      </xs:complexType>
+    </xs:element>
+    <xs:element name="TermInfo">
+      <xs:complexType>
+        <xs:sequence>
+          <xs:element ref="pc:TermName" minOccurs="0"/>
+          <xs:element ref="pc:TermId" minOccurs="0"/>
+        </xs:sequence>
+      </xs:complexType>
+    </xs:element>
+    <xs:element name="TermName" type="xs:string"/>
+    <xs:element name="TermId" type="xs:string"/>
+  </xs:schema>
+</ct:contentTypeSchema>
+</file>
+
+<file path=customXml/item2.xml><?xml version="1.0" encoding="utf-8"?>
+<?mso-contentType ?>
+<FormTemplates xmlns="http://schemas.microsoft.com/sharepoint/v3/contenttype/forms">
+  <Display>DocumentLibraryForm</Display>
+  <Edit>DocumentLibraryForm</Edit>
+  <New>DocumentLibraryForm</New>
+</FormTemplates>
+</file>
+
+<file path=customXml/item3.xml><?xml version="1.0" encoding="utf-8"?>
+<p:properties xmlns:p="http://schemas.microsoft.com/office/2006/metadata/properties" xmlns:xsi="http://www.w3.org/2001/XMLSchema-instance" xmlns:pc="http://schemas.microsoft.com/office/infopath/2007/PartnerControls">
+  <documentManagement>
+    <lcf76f155ced4ddcb4097134ff3c332f xmlns="25391028-02bd-44eb-89ce-c859de1c4f55">
+      <Terms xmlns="http://schemas.microsoft.com/office/infopath/2007/PartnerControls"/>
+    </lcf76f155ced4ddcb4097134ff3c332f>
+  </documentManagement>
+</p:properties>
+</file>
+
+<file path=customXml/itemProps1.xml><?xml version="1.0" encoding="utf-8"?>
+<ds:datastoreItem xmlns:ds="http://schemas.openxmlformats.org/officeDocument/2006/customXml" ds:itemID="{263D419D-B808-4F79-A762-1306DF47B6B2}"/>
+</file>
+
+<file path=customXml/itemProps2.xml><?xml version="1.0" encoding="utf-8"?>
+<ds:datastoreItem xmlns:ds="http://schemas.openxmlformats.org/officeDocument/2006/customXml" ds:itemID="{BE4474FC-8122-4EB5-B413-C69659147F6E}"/>
+</file>
+
+<file path=customXml/itemProps3.xml><?xml version="1.0" encoding="utf-8"?>
+<ds:datastoreItem xmlns:ds="http://schemas.openxmlformats.org/officeDocument/2006/customXml" ds:itemID="{752BDBF3-E13A-4068-9851-9D25F5FAB605}"/>
 </file>
</xml_diff>

<commit_message>
chore: Update presentation files in Social Enterprise directory
</commit_message>
<xml_diff>
--- a/Social Enterprise/이인희 약력 및 소개.pptx
+++ b/Social Enterprise/이인희 약력 및 소개.pptx
@@ -4041,9 +4041,10 @@
 </file>
 
 <file path=customXml/item1.xml><?xml version="1.0" encoding="utf-8"?>
-<ct:contentTypeSchema xmlns:ct="http://schemas.microsoft.com/office/2006/metadata/contentType" xmlns:ma="http://schemas.microsoft.com/office/2006/metadata/properties/metaAttributes" ct:_="" ma:_="" ma:contentTypeName="Document" ma:contentTypeID="0x01010089C4D2C766D8D8439BE1066AE870F215" ma:contentTypeVersion="10" ma:contentTypeDescription="Create a new document." ma:contentTypeScope="" ma:versionID="53a7b00c97c089a1aac2965fa8afdf88">
-  <xsd:schema xmlns:xsd="http://www.w3.org/2001/XMLSchema" xmlns:xs="http://www.w3.org/2001/XMLSchema" xmlns:p="http://schemas.microsoft.com/office/2006/metadata/properties" xmlns:ns2="25391028-02bd-44eb-89ce-c859de1c4f55" targetNamespace="http://schemas.microsoft.com/office/2006/metadata/properties" ma:root="true" ma:fieldsID="5960622e01d4445b7feaa503e6944d74" ns2:_="">
-    <xsd:import namespace="25391028-02bd-44eb-89ce-c859de1c4f55"/>
+<ct:contentTypeSchema xmlns:ct="http://schemas.microsoft.com/office/2006/metadata/contentType" xmlns:ma="http://schemas.microsoft.com/office/2006/metadata/properties/metaAttributes" ct:_="" ma:_="" ma:contentTypeName="Document" ma:contentTypeID="0x0101005A71126DF2146E48AFDE7325370623B1" ma:contentTypeVersion="12" ma:contentTypeDescription="Create a new document." ma:contentTypeScope="" ma:versionID="528b208a3da2efd65641f64b023b285e">
+  <xsd:schema xmlns:xsd="http://www.w3.org/2001/XMLSchema" xmlns:xs="http://www.w3.org/2001/XMLSchema" xmlns:p="http://schemas.microsoft.com/office/2006/metadata/properties" xmlns:ns2="278a8a1c-d9da-4eb8-bb56-c5211e805b3a" xmlns:ns3="d9ef127c-eef0-4192-ae23-d6fca5603b91" targetNamespace="http://schemas.microsoft.com/office/2006/metadata/properties" ma:root="true" ma:fieldsID="2f3267fa69ddf3746673c0cd44a518e2" ns2:_="" ns3:_="">
+    <xsd:import namespace="278a8a1c-d9da-4eb8-bb56-c5211e805b3a"/>
+    <xsd:import namespace="d9ef127c-eef0-4192-ae23-d6fca5603b91"/>
     <xsd:element name="properties">
       <xsd:complexType>
         <xsd:sequence>
@@ -4053,12 +4054,14 @@
                 <xsd:element ref="ns2:MediaServiceMetadata" minOccurs="0"/>
                 <xsd:element ref="ns2:MediaServiceFastMetadata" minOccurs="0"/>
                 <xsd:element ref="ns2:MediaServiceSearchProperties" minOccurs="0"/>
+                <xsd:element ref="ns2:MediaServiceObjectDetectorVersions" minOccurs="0"/>
                 <xsd:element ref="ns2:MediaServiceDateTaken" minOccurs="0"/>
+                <xsd:element ref="ns2:lcf76f155ced4ddcb4097134ff3c332f" minOccurs="0"/>
+                <xsd:element ref="ns3:TaxCatchAll" minOccurs="0"/>
+                <xsd:element ref="ns2:MediaServiceOCR" minOccurs="0"/>
                 <xsd:element ref="ns2:MediaServiceGenerationTime" minOccurs="0"/>
                 <xsd:element ref="ns2:MediaServiceEventHashCode" minOccurs="0"/>
-                <xsd:element ref="ns2:lcf76f155ced4ddcb4097134ff3c332f" minOccurs="0"/>
-                <xsd:element ref="ns2:MediaServiceOCR" minOccurs="0"/>
-                <xsd:element ref="ns2:MediaLengthInSeconds" minOccurs="0"/>
+                <xsd:element ref="ns2:MediaServiceLocation" minOccurs="0"/>
               </xsd:all>
             </xsd:complexType>
           </xsd:element>
@@ -4066,7 +4069,7 @@
       </xsd:complexType>
     </xsd:element>
   </xsd:schema>
-  <xsd:schema xmlns:xsd="http://www.w3.org/2001/XMLSchema" xmlns:xs="http://www.w3.org/2001/XMLSchema" xmlns:dms="http://schemas.microsoft.com/office/2006/documentManagement/types" xmlns:pc="http://schemas.microsoft.com/office/infopath/2007/PartnerControls" targetNamespace="25391028-02bd-44eb-89ce-c859de1c4f55" elementFormDefault="qualified">
+  <xsd:schema xmlns:xsd="http://www.w3.org/2001/XMLSchema" xmlns:xs="http://www.w3.org/2001/XMLSchema" xmlns:dms="http://schemas.microsoft.com/office/2006/documentManagement/types" xmlns:pc="http://schemas.microsoft.com/office/infopath/2007/PartnerControls" targetNamespace="278a8a1c-d9da-4eb8-bb56-c5211e805b3a" elementFormDefault="qualified">
     <xsd:import namespace="http://schemas.microsoft.com/office/2006/documentManagement/types"/>
     <xsd:import namespace="http://schemas.microsoft.com/office/infopath/2007/PartnerControls"/>
     <xsd:element name="MediaServiceMetadata" ma:index="8" nillable="true" ma:displayName="MediaServiceMetadata" ma:hidden="true" ma:internalName="MediaServiceMetadata" ma:readOnly="true">
@@ -4084,22 +4087,17 @@
         <xsd:restriction base="dms:Note"/>
       </xsd:simpleType>
     </xsd:element>
-    <xsd:element name="MediaServiceDateTaken" ma:index="11" nillable="true" ma:displayName="MediaServiceDateTaken" ma:hidden="true" ma:indexed="true" ma:internalName="MediaServiceDateTaken" ma:readOnly="true">
+    <xsd:element name="MediaServiceObjectDetectorVersions" ma:index="11" nillable="true" ma:displayName="MediaServiceObjectDetectorVersions" ma:hidden="true" ma:indexed="true" ma:internalName="MediaServiceObjectDetectorVersions" ma:readOnly="true">
       <xsd:simpleType>
         <xsd:restriction base="dms:Text"/>
       </xsd:simpleType>
     </xsd:element>
-    <xsd:element name="MediaServiceGenerationTime" ma:index="12" nillable="true" ma:displayName="MediaServiceGenerationTime" ma:hidden="true" ma:internalName="MediaServiceGenerationTime" ma:readOnly="true">
+    <xsd:element name="MediaServiceDateTaken" ma:index="12" nillable="true" ma:displayName="MediaServiceDateTaken" ma:hidden="true" ma:indexed="true" ma:internalName="MediaServiceDateTaken" ma:readOnly="true">
       <xsd:simpleType>
         <xsd:restriction base="dms:Text"/>
       </xsd:simpleType>
     </xsd:element>
-    <xsd:element name="MediaServiceEventHashCode" ma:index="13" nillable="true" ma:displayName="MediaServiceEventHashCode" ma:hidden="true" ma:internalName="MediaServiceEventHashCode" ma:readOnly="true">
-      <xsd:simpleType>
-        <xsd:restriction base="dms:Text"/>
-      </xsd:simpleType>
-    </xsd:element>
-    <xsd:element name="lcf76f155ced4ddcb4097134ff3c332f" ma:index="15" nillable="true" ma:taxonomy="true" ma:internalName="lcf76f155ced4ddcb4097134ff3c332f" ma:taxonomyFieldName="MediaServiceImageTags" ma:displayName="Image Tags" ma:readOnly="false" ma:fieldId="{5cf76f15-5ced-4ddc-b409-7134ff3c332f}" ma:taxonomyMulti="true" ma:sspId="2c80db7e-f82a-4f67-ad39-cc0146d5555d" ma:termSetId="09814cd3-568e-fe90-9814-8d621ff8fb84" ma:anchorId="fba54fb3-c3e1-fe81-a776-ca4b69148c4d" ma:open="true" ma:isKeyword="false">
+    <xsd:element name="lcf76f155ced4ddcb4097134ff3c332f" ma:index="14" nillable="true" ma:taxonomy="true" ma:internalName="lcf76f155ced4ddcb4097134ff3c332f" ma:taxonomyFieldName="MediaServiceImageTags" ma:displayName="Image Tags" ma:readOnly="false" ma:fieldId="{5cf76f15-5ced-4ddc-b409-7134ff3c332f}" ma:taxonomyMulti="true" ma:sspId="2c80db7e-f82a-4f67-ad39-cc0146d5555d" ma:termSetId="09814cd3-568e-fe90-9814-8d621ff8fb84" ma:anchorId="fba54fb3-c3e1-fe81-a776-ca4b69148c4d" ma:open="true" ma:isKeyword="false">
       <xsd:complexType>
         <xsd:sequence>
           <xsd:element ref="pc:Terms" minOccurs="0" maxOccurs="1"/>
@@ -4113,10 +4111,35 @@
         </xsd:restriction>
       </xsd:simpleType>
     </xsd:element>
-    <xsd:element name="MediaLengthInSeconds" ma:index="17" nillable="true" ma:displayName="MediaLengthInSeconds" ma:hidden="true" ma:internalName="MediaLengthInSeconds" ma:readOnly="true">
+    <xsd:element name="MediaServiceGenerationTime" ma:index="17" nillable="true" ma:displayName="MediaServiceGenerationTime" ma:hidden="true" ma:internalName="MediaServiceGenerationTime" ma:readOnly="true">
       <xsd:simpleType>
-        <xsd:restriction base="dms:Unknown"/>
+        <xsd:restriction base="dms:Text"/>
       </xsd:simpleType>
+    </xsd:element>
+    <xsd:element name="MediaServiceEventHashCode" ma:index="18" nillable="true" ma:displayName="MediaServiceEventHashCode" ma:hidden="true" ma:internalName="MediaServiceEventHashCode" ma:readOnly="true">
+      <xsd:simpleType>
+        <xsd:restriction base="dms:Text"/>
+      </xsd:simpleType>
+    </xsd:element>
+    <xsd:element name="MediaServiceLocation" ma:index="19" nillable="true" ma:displayName="Location" ma:indexed="true" ma:internalName="MediaServiceLocation" ma:readOnly="true">
+      <xsd:simpleType>
+        <xsd:restriction base="dms:Text"/>
+      </xsd:simpleType>
+    </xsd:element>
+  </xsd:schema>
+  <xsd:schema xmlns:xsd="http://www.w3.org/2001/XMLSchema" xmlns:xs="http://www.w3.org/2001/XMLSchema" xmlns:dms="http://schemas.microsoft.com/office/2006/documentManagement/types" xmlns:pc="http://schemas.microsoft.com/office/infopath/2007/PartnerControls" targetNamespace="d9ef127c-eef0-4192-ae23-d6fca5603b91" elementFormDefault="qualified">
+    <xsd:import namespace="http://schemas.microsoft.com/office/2006/documentManagement/types"/>
+    <xsd:import namespace="http://schemas.microsoft.com/office/infopath/2007/PartnerControls"/>
+    <xsd:element name="TaxCatchAll" ma:index="15" nillable="true" ma:displayName="Taxonomy Catch All Column" ma:hidden="true" ma:list="{f3528c49-d662-47ec-8f2c-c5e56d86aa1c}" ma:internalName="TaxCatchAll" ma:showField="CatchAllData" ma:web="d9ef127c-eef0-4192-ae23-d6fca5603b91">
+      <xsd:complexType>
+        <xsd:complexContent>
+          <xsd:extension base="dms:MultiChoiceLookup">
+            <xsd:sequence>
+              <xsd:element name="Value" type="dms:Lookup" maxOccurs="unbounded" minOccurs="0" nillable="true"/>
+            </xsd:sequence>
+          </xsd:extension>
+        </xsd:complexContent>
+      </xsd:complexType>
     </xsd:element>
   </xsd:schema>
   <xsd:schema xmlns="http://schemas.openxmlformats.org/package/2006/metadata/core-properties" xmlns:xsd="http://www.w3.org/2001/XMLSchema" xmlns:xsi="http://www.w3.org/2001/XMLSchema-instance" xmlns:dc="http://purl.org/dc/elements/1.1/" xmlns:dcterms="http://purl.org/dc/terms/" xmlns:odoc="http://schemas.microsoft.com/internal/obd" targetNamespace="http://schemas.openxmlformats.org/package/2006/metadata/core-properties" elementFormDefault="qualified" attributeFormDefault="unqualified" blockDefault="#all">
@@ -4230,15 +4253,16 @@
 <file path=customXml/item3.xml><?xml version="1.0" encoding="utf-8"?>
 <p:properties xmlns:p="http://schemas.microsoft.com/office/2006/metadata/properties" xmlns:xsi="http://www.w3.org/2001/XMLSchema-instance" xmlns:pc="http://schemas.microsoft.com/office/infopath/2007/PartnerControls">
   <documentManagement>
-    <lcf76f155ced4ddcb4097134ff3c332f xmlns="25391028-02bd-44eb-89ce-c859de1c4f55">
+    <lcf76f155ced4ddcb4097134ff3c332f xmlns="278a8a1c-d9da-4eb8-bb56-c5211e805b3a">
       <Terms xmlns="http://schemas.microsoft.com/office/infopath/2007/PartnerControls"/>
     </lcf76f155ced4ddcb4097134ff3c332f>
+    <TaxCatchAll xmlns="d9ef127c-eef0-4192-ae23-d6fca5603b91" xsi:nil="true"/>
   </documentManagement>
 </p:properties>
 </file>
 
 <file path=customXml/itemProps1.xml><?xml version="1.0" encoding="utf-8"?>
-<ds:datastoreItem xmlns:ds="http://schemas.openxmlformats.org/officeDocument/2006/customXml" ds:itemID="{263D419D-B808-4F79-A762-1306DF47B6B2}"/>
+<ds:datastoreItem xmlns:ds="http://schemas.openxmlformats.org/officeDocument/2006/customXml" ds:itemID="{0E196BED-9F7D-4BB2-AA22-D70E1CF50AC0}"/>
 </file>
 
 <file path=customXml/itemProps2.xml><?xml version="1.0" encoding="utf-8"?>

</xml_diff>